<commit_message>
completed Project Check-in #3 and finalized poster
</commit_message>
<xml_diff>
--- a/Poster.pptx
+++ b/Poster.pptx
@@ -200,7 +200,7 @@
           <a:p>
             <a:fld id="{09B1ED5F-9FF0-8343-B4E2-E8E792FB1C5A}" type="datetimeFigureOut">
               <a:rPr lang="en-US" smtClean="0"/>
-              <a:t>4/29/25</a:t>
+              <a:t>4/30/25</a:t>
             </a:fld>
             <a:endParaRPr lang="en-US"/>
           </a:p>
@@ -682,7 +682,7 @@
           <a:p>
             <a:fld id="{7DEF6B15-9A0C-DF4C-888D-CA13E380600B}" type="datetimeFigureOut">
               <a:rPr lang="en-US" smtClean="0"/>
-              <a:t>4/29/25</a:t>
+              <a:t>4/30/25</a:t>
             </a:fld>
             <a:endParaRPr lang="en-US"/>
           </a:p>
@@ -852,7 +852,7 @@
           <a:p>
             <a:fld id="{7DEF6B15-9A0C-DF4C-888D-CA13E380600B}" type="datetimeFigureOut">
               <a:rPr lang="en-US" smtClean="0"/>
-              <a:t>4/29/25</a:t>
+              <a:t>4/30/25</a:t>
             </a:fld>
             <a:endParaRPr lang="en-US"/>
           </a:p>
@@ -1032,7 +1032,7 @@
           <a:p>
             <a:fld id="{7DEF6B15-9A0C-DF4C-888D-CA13E380600B}" type="datetimeFigureOut">
               <a:rPr lang="en-US" smtClean="0"/>
-              <a:t>4/29/25</a:t>
+              <a:t>4/30/25</a:t>
             </a:fld>
             <a:endParaRPr lang="en-US"/>
           </a:p>
@@ -1202,7 +1202,7 @@
           <a:p>
             <a:fld id="{7DEF6B15-9A0C-DF4C-888D-CA13E380600B}" type="datetimeFigureOut">
               <a:rPr lang="en-US" smtClean="0"/>
-              <a:t>4/29/25</a:t>
+              <a:t>4/30/25</a:t>
             </a:fld>
             <a:endParaRPr lang="en-US"/>
           </a:p>
@@ -1448,7 +1448,7 @@
           <a:p>
             <a:fld id="{7DEF6B15-9A0C-DF4C-888D-CA13E380600B}" type="datetimeFigureOut">
               <a:rPr lang="en-US" smtClean="0"/>
-              <a:t>4/29/25</a:t>
+              <a:t>4/30/25</a:t>
             </a:fld>
             <a:endParaRPr lang="en-US"/>
           </a:p>
@@ -1680,7 +1680,7 @@
           <a:p>
             <a:fld id="{7DEF6B15-9A0C-DF4C-888D-CA13E380600B}" type="datetimeFigureOut">
               <a:rPr lang="en-US" smtClean="0"/>
-              <a:t>4/29/25</a:t>
+              <a:t>4/30/25</a:t>
             </a:fld>
             <a:endParaRPr lang="en-US"/>
           </a:p>
@@ -2047,7 +2047,7 @@
           <a:p>
             <a:fld id="{7DEF6B15-9A0C-DF4C-888D-CA13E380600B}" type="datetimeFigureOut">
               <a:rPr lang="en-US" smtClean="0"/>
-              <a:t>4/29/25</a:t>
+              <a:t>4/30/25</a:t>
             </a:fld>
             <a:endParaRPr lang="en-US"/>
           </a:p>
@@ -2165,7 +2165,7 @@
           <a:p>
             <a:fld id="{7DEF6B15-9A0C-DF4C-888D-CA13E380600B}" type="datetimeFigureOut">
               <a:rPr lang="en-US" smtClean="0"/>
-              <a:t>4/29/25</a:t>
+              <a:t>4/30/25</a:t>
             </a:fld>
             <a:endParaRPr lang="en-US"/>
           </a:p>
@@ -2260,7 +2260,7 @@
           <a:p>
             <a:fld id="{7DEF6B15-9A0C-DF4C-888D-CA13E380600B}" type="datetimeFigureOut">
               <a:rPr lang="en-US" smtClean="0"/>
-              <a:t>4/29/25</a:t>
+              <a:t>4/30/25</a:t>
             </a:fld>
             <a:endParaRPr lang="en-US"/>
           </a:p>
@@ -2537,7 +2537,7 @@
           <a:p>
             <a:fld id="{7DEF6B15-9A0C-DF4C-888D-CA13E380600B}" type="datetimeFigureOut">
               <a:rPr lang="en-US" smtClean="0"/>
-              <a:t>4/29/25</a:t>
+              <a:t>4/30/25</a:t>
             </a:fld>
             <a:endParaRPr lang="en-US"/>
           </a:p>
@@ -2794,7 +2794,7 @@
           <a:p>
             <a:fld id="{7DEF6B15-9A0C-DF4C-888D-CA13E380600B}" type="datetimeFigureOut">
               <a:rPr lang="en-US" smtClean="0"/>
-              <a:t>4/29/25</a:t>
+              <a:t>4/30/25</a:t>
             </a:fld>
             <a:endParaRPr lang="en-US"/>
           </a:p>
@@ -3007,7 +3007,7 @@
           <a:p>
             <a:fld id="{7DEF6B15-9A0C-DF4C-888D-CA13E380600B}" type="datetimeFigureOut">
               <a:rPr lang="en-US" smtClean="0"/>
-              <a:t>4/29/25</a:t>
+              <a:t>4/30/25</a:t>
             </a:fld>
             <a:endParaRPr lang="en-US"/>
           </a:p>
@@ -4382,7 +4382,27 @@
                 <a:effectLst/>
                 <a:latin typeface="Baskerville Old Face" panose="02020602080505020303" pitchFamily="18" charset="77"/>
               </a:rPr>
-              <a:t>By Epoch 60+, loss stabilizes below 1.0 in most cases, with some fluctuations.</a:t>
+              <a:t>By </a:t>
+            </a:r>
+            <a:r>
+              <a:rPr lang="en-US" sz="3000" b="0" i="0" u="none" strike="noStrike">
+                <a:solidFill>
+                  <a:srgbClr val="000000"/>
+                </a:solidFill>
+                <a:effectLst/>
+                <a:latin typeface="Baskerville Old Face" panose="02020602080505020303" pitchFamily="18" charset="77"/>
+              </a:rPr>
+              <a:t>Epoch 60, </a:t>
+            </a:r>
+            <a:r>
+              <a:rPr lang="en-US" sz="3000" b="0" i="0" u="none" strike="noStrike" dirty="0">
+                <a:solidFill>
+                  <a:srgbClr val="000000"/>
+                </a:solidFill>
+                <a:effectLst/>
+                <a:latin typeface="Baskerville Old Face" panose="02020602080505020303" pitchFamily="18" charset="77"/>
+              </a:rPr>
+              <a:t>loss stabilizes below 1.0 in most cases, with some fluctuations.</a:t>
             </a:r>
           </a:p>
           <a:p>
@@ -4725,7 +4745,29 @@
                 <a:latin typeface="Baskerville Old Face" panose="02020602080505020303" pitchFamily="18" charset="77"/>
                 <a:ea typeface="Baskerville" panose="02020502070401020303" pitchFamily="18" charset="0"/>
               </a:rPr>
-              <a:t>Implement Monte Carlo Tree Search (MCTS) to guide actions.</a:t>
+              <a:t>Improve Monte Carlo Tree Search (MCTS) with Dirichlet exploration and temperature </a:t>
+            </a:r>
+            <a:r>
+              <a:rPr lang="en-US" sz="3000" b="0" i="0" u="none" strike="noStrike" dirty="0" err="1">
+                <a:solidFill>
+                  <a:srgbClr val="000000"/>
+                </a:solidFill>
+                <a:effectLst/>
+                <a:latin typeface="Baskerville Old Face" panose="02020602080505020303" pitchFamily="18" charset="77"/>
+                <a:ea typeface="Baskerville" panose="02020502070401020303" pitchFamily="18" charset="0"/>
+              </a:rPr>
+              <a:t>softmax</a:t>
+            </a:r>
+            <a:r>
+              <a:rPr lang="en-US" sz="3000" b="0" i="0" u="none" strike="noStrike" dirty="0">
+                <a:solidFill>
+                  <a:srgbClr val="000000"/>
+                </a:solidFill>
+                <a:effectLst/>
+                <a:latin typeface="Baskerville Old Face" panose="02020602080505020303" pitchFamily="18" charset="77"/>
+                <a:ea typeface="Baskerville" panose="02020502070401020303" pitchFamily="18" charset="0"/>
+              </a:rPr>
+              <a:t> sampling; finetune rollout steps and learning rate.</a:t>
             </a:r>
           </a:p>
           <a:p>
@@ -4745,7 +4787,7 @@
                 <a:latin typeface="Baskerville Old Face" panose="02020602080505020303" pitchFamily="18" charset="77"/>
                 <a:ea typeface="Baskerville" panose="02020502070401020303" pitchFamily="18" charset="0"/>
               </a:rPr>
-              <a:t>Finalize architecture, deploy Oscar CCV training job for pinball gameplay, and track performance metrics lik</a:t>
+              <a:t>Deploy Pinball environment training </a:t>
             </a:r>
             <a:r>
               <a:rPr lang="en-US" sz="3000" dirty="0">
@@ -4755,16 +4797,19 @@
                 <a:latin typeface="Baskerville Old Face" panose="02020602080505020303" pitchFamily="18" charset="77"/>
                 <a:ea typeface="Baskerville" panose="02020502070401020303" pitchFamily="18" charset="0"/>
               </a:rPr>
-              <a:t>e average reward and duration.</a:t>
-            </a:r>
-            <a:endParaRPr lang="en-US" sz="3000" b="0" i="0" u="none" strike="noStrike" dirty="0">
-              <a:solidFill>
-                <a:srgbClr val="000000"/>
-              </a:solidFill>
-              <a:effectLst/>
-              <a:latin typeface="Baskerville Old Face" panose="02020602080505020303" pitchFamily="18" charset="77"/>
-              <a:ea typeface="Baskerville" panose="02020502070401020303" pitchFamily="18" charset="0"/>
-            </a:endParaRPr>
+              <a:t>job on </a:t>
+            </a:r>
+            <a:r>
+              <a:rPr lang="en-US" sz="3000" b="0" i="0" u="none" strike="noStrike" dirty="0">
+                <a:solidFill>
+                  <a:srgbClr val="000000"/>
+                </a:solidFill>
+                <a:effectLst/>
+                <a:latin typeface="Baskerville Old Face" panose="02020602080505020303" pitchFamily="18" charset="77"/>
+                <a:ea typeface="Baskerville" panose="02020502070401020303" pitchFamily="18" charset="0"/>
+              </a:rPr>
+              <a:t>Oscar CCV.</a:t>
+            </a:r>
           </a:p>
         </p:txBody>
       </p:sp>
@@ -4834,6 +4879,9 @@
           </a:p>
           <a:p>
             <a:pPr algn="just">
+              <a:spcBef>
+                <a:spcPts val="800"/>
+              </a:spcBef>
               <a:spcAft>
                 <a:spcPts val="1200"/>
               </a:spcAft>
@@ -5099,7 +5147,7 @@
                 <a:effectLst/>
                 <a:latin typeface="Baskerville Old Face" panose="02020602080505020303" pitchFamily="18" charset="77"/>
               </a:rPr>
-              <a:t> hyperparameters, developing deeper network architectures, and evaluating the agent's ability to generalize to different pinball layouts.</a:t>
+              <a:t> hyperparameters, developing deeper network architectures, and evaluating the agent's ability to generalize to different Pinball layouts.</a:t>
             </a:r>
           </a:p>
         </p:txBody>
@@ -5152,7 +5200,7 @@
           <a:p>
             <a:pPr>
               <a:spcAft>
-                <a:spcPts val="2000"/>
+                <a:spcPts val="1200"/>
               </a:spcAft>
             </a:pPr>
             <a:r>
@@ -5170,6 +5218,12 @@
           </a:p>
           <a:p>
             <a:pPr marL="514350" indent="-514350">
+              <a:spcBef>
+                <a:spcPts val="800"/>
+              </a:spcBef>
+              <a:spcAft>
+                <a:spcPts val="1200"/>
+              </a:spcAft>
               <a:buFont typeface="+mj-lt"/>
               <a:buAutoNum type="arabicPeriod"/>
             </a:pPr>
@@ -5236,6 +5290,9 @@
           </a:p>
           <a:p>
             <a:pPr marL="514350" indent="-514350">
+              <a:spcAft>
+                <a:spcPts val="1200"/>
+              </a:spcAft>
               <a:buFont typeface="+mj-lt"/>
               <a:buAutoNum type="arabicPeriod"/>
             </a:pPr>
@@ -5384,7 +5441,7 @@
         </p:blipFill>
         <p:spPr>
           <a:xfrm>
-            <a:off x="30831870" y="14615661"/>
+            <a:off x="30831870" y="14691861"/>
             <a:ext cx="8548464" cy="6670997"/>
           </a:xfrm>
           <a:prstGeom prst="rect">

</xml_diff>